<commit_message>
worked through most coments
</commit_message>
<xml_diff>
--- a/pre-processing/MA/analysis/plot_measurements.pptx
+++ b/pre-processing/MA/analysis/plot_measurements.pptx
@@ -7,6 +7,7 @@
   <p:sldIdLst>
     <p:sldId id="256" r:id="rId2"/>
     <p:sldId id="257" r:id="rId3"/>
+    <p:sldId id="258" r:id="rId4"/>
   </p:sldIdLst>
   <p:sldSz cx="12192000" cy="6858000"/>
   <p:notesSz cx="6858000" cy="9144000"/>
@@ -105,6 +106,11 @@
       </a:defRPr>
     </a:lvl9pPr>
   </p:defaultTextStyle>
+  <p:extLst>
+    <p:ext uri="{EFAFB233-063F-42B5-8137-9DF3F51BA10A}">
+      <p15:sldGuideLst xmlns:p15="http://schemas.microsoft.com/office/powerpoint/2012/main"/>
+    </p:ext>
+  </p:extLst>
 </p:presentation>
 </file>
 
@@ -239,7 +245,7 @@
           <a:p>
             <a:fld id="{75D63926-C02C-9B48-A59D-146E7B2FF530}" type="datetimeFigureOut">
               <a:rPr lang="en-US" smtClean="0"/>
-              <a:t>11/20/17</a:t>
+              <a:t>7/31/19</a:t>
             </a:fld>
             <a:endParaRPr lang="en-US"/>
           </a:p>
@@ -409,7 +415,7 @@
           <a:p>
             <a:fld id="{75D63926-C02C-9B48-A59D-146E7B2FF530}" type="datetimeFigureOut">
               <a:rPr lang="en-US" smtClean="0"/>
-              <a:t>11/20/17</a:t>
+              <a:t>7/31/19</a:t>
             </a:fld>
             <a:endParaRPr lang="en-US"/>
           </a:p>
@@ -589,7 +595,7 @@
           <a:p>
             <a:fld id="{75D63926-C02C-9B48-A59D-146E7B2FF530}" type="datetimeFigureOut">
               <a:rPr lang="en-US" smtClean="0"/>
-              <a:t>11/20/17</a:t>
+              <a:t>7/31/19</a:t>
             </a:fld>
             <a:endParaRPr lang="en-US"/>
           </a:p>
@@ -759,7 +765,7 @@
           <a:p>
             <a:fld id="{75D63926-C02C-9B48-A59D-146E7B2FF530}" type="datetimeFigureOut">
               <a:rPr lang="en-US" smtClean="0"/>
-              <a:t>11/20/17</a:t>
+              <a:t>7/31/19</a:t>
             </a:fld>
             <a:endParaRPr lang="en-US"/>
           </a:p>
@@ -1005,7 +1011,7 @@
           <a:p>
             <a:fld id="{75D63926-C02C-9B48-A59D-146E7B2FF530}" type="datetimeFigureOut">
               <a:rPr lang="en-US" smtClean="0"/>
-              <a:t>11/20/17</a:t>
+              <a:t>7/31/19</a:t>
             </a:fld>
             <a:endParaRPr lang="en-US"/>
           </a:p>
@@ -1237,7 +1243,7 @@
           <a:p>
             <a:fld id="{75D63926-C02C-9B48-A59D-146E7B2FF530}" type="datetimeFigureOut">
               <a:rPr lang="en-US" smtClean="0"/>
-              <a:t>11/20/17</a:t>
+              <a:t>7/31/19</a:t>
             </a:fld>
             <a:endParaRPr lang="en-US"/>
           </a:p>
@@ -1604,7 +1610,7 @@
           <a:p>
             <a:fld id="{75D63926-C02C-9B48-A59D-146E7B2FF530}" type="datetimeFigureOut">
               <a:rPr lang="en-US" smtClean="0"/>
-              <a:t>11/20/17</a:t>
+              <a:t>7/31/19</a:t>
             </a:fld>
             <a:endParaRPr lang="en-US"/>
           </a:p>
@@ -1722,7 +1728,7 @@
           <a:p>
             <a:fld id="{75D63926-C02C-9B48-A59D-146E7B2FF530}" type="datetimeFigureOut">
               <a:rPr lang="en-US" smtClean="0"/>
-              <a:t>11/20/17</a:t>
+              <a:t>7/31/19</a:t>
             </a:fld>
             <a:endParaRPr lang="en-US"/>
           </a:p>
@@ -1817,7 +1823,7 @@
           <a:p>
             <a:fld id="{75D63926-C02C-9B48-A59D-146E7B2FF530}" type="datetimeFigureOut">
               <a:rPr lang="en-US" smtClean="0"/>
-              <a:t>11/20/17</a:t>
+              <a:t>7/31/19</a:t>
             </a:fld>
             <a:endParaRPr lang="en-US"/>
           </a:p>
@@ -2094,7 +2100,7 @@
           <a:p>
             <a:fld id="{75D63926-C02C-9B48-A59D-146E7B2FF530}" type="datetimeFigureOut">
               <a:rPr lang="en-US" smtClean="0"/>
-              <a:t>11/20/17</a:t>
+              <a:t>7/31/19</a:t>
             </a:fld>
             <a:endParaRPr lang="en-US"/>
           </a:p>
@@ -2347,7 +2353,7 @@
           <a:p>
             <a:fld id="{75D63926-C02C-9B48-A59D-146E7B2FF530}" type="datetimeFigureOut">
               <a:rPr lang="en-US" smtClean="0"/>
-              <a:t>11/20/17</a:t>
+              <a:t>7/31/19</a:t>
             </a:fld>
             <a:endParaRPr lang="en-US"/>
           </a:p>
@@ -2560,7 +2566,7 @@
           <a:p>
             <a:fld id="{75D63926-C02C-9B48-A59D-146E7B2FF530}" type="datetimeFigureOut">
               <a:rPr lang="en-US" smtClean="0"/>
-              <a:t>11/20/17</a:t>
+              <a:t>7/31/19</a:t>
             </a:fld>
             <a:endParaRPr lang="en-US"/>
           </a:p>
@@ -3394,6 +3400,224 @@
 </p:sld>
 </file>
 
+<file path=ppt/slides/slide3.xml><?xml version="1.0" encoding="utf-8"?>
+<p:sld xmlns:a="http://schemas.openxmlformats.org/drawingml/2006/main" xmlns:r="http://schemas.openxmlformats.org/officeDocument/2006/relationships" xmlns:p="http://schemas.openxmlformats.org/presentationml/2006/main">
+  <p:cSld>
+    <p:spTree>
+      <p:nvGrpSpPr>
+        <p:cNvPr id="1" name=""/>
+        <p:cNvGrpSpPr/>
+        <p:nvPr/>
+      </p:nvGrpSpPr>
+      <p:grpSpPr>
+        <a:xfrm>
+          <a:off x="0" y="0"/>
+          <a:ext cx="0" cy="0"/>
+          <a:chOff x="0" y="0"/>
+          <a:chExt cx="0" cy="0"/>
+        </a:xfrm>
+      </p:grpSpPr>
+      <p:pic>
+        <p:nvPicPr>
+          <p:cNvPr id="4" name="Content Placeholder 3"/>
+          <p:cNvPicPr>
+            <a:picLocks noGrp="1" noChangeAspect="1"/>
+          </p:cNvPicPr>
+          <p:nvPr>
+            <p:ph idx="1"/>
+          </p:nvPr>
+        </p:nvPicPr>
+        <p:blipFill>
+          <a:blip r:embed="rId2">
+            <a:extLst>
+              <a:ext uri="{28A0092B-C50C-407E-A947-70E740481C1C}">
+                <a14:useLocalDpi xmlns:a14="http://schemas.microsoft.com/office/drawing/2010/main" val="0"/>
+              </a:ext>
+            </a:extLst>
+          </a:blip>
+          <a:stretch>
+            <a:fillRect/>
+          </a:stretch>
+        </p:blipFill>
+        <p:spPr>
+          <a:xfrm>
+            <a:off x="2850208" y="1041134"/>
+            <a:ext cx="5803900" cy="3822700"/>
+          </a:xfrm>
+        </p:spPr>
+      </p:pic>
+      <p:cxnSp>
+        <p:nvCxnSpPr>
+          <p:cNvPr id="5" name="Straight Connector 4"/>
+          <p:cNvCxnSpPr/>
+          <p:nvPr/>
+        </p:nvCxnSpPr>
+        <p:spPr>
+          <a:xfrm flipH="1">
+            <a:off x="6242050" y="1869722"/>
+            <a:ext cx="522" cy="108303"/>
+          </a:xfrm>
+          <a:prstGeom prst="line">
+            <a:avLst/>
+          </a:prstGeom>
+          <a:ln>
+            <a:solidFill>
+              <a:srgbClr val="FF0000"/>
+            </a:solidFill>
+          </a:ln>
+        </p:spPr>
+        <p:style>
+          <a:lnRef idx="1">
+            <a:schemeClr val="accent1"/>
+          </a:lnRef>
+          <a:fillRef idx="0">
+            <a:schemeClr val="accent1"/>
+          </a:fillRef>
+          <a:effectRef idx="0">
+            <a:schemeClr val="accent1"/>
+          </a:effectRef>
+          <a:fontRef idx="minor">
+            <a:schemeClr val="tx1"/>
+          </a:fontRef>
+        </p:style>
+      </p:cxnSp>
+      <p:sp>
+        <p:nvSpPr>
+          <p:cNvPr id="9" name="TextBox 8"/>
+          <p:cNvSpPr txBox="1"/>
+          <p:nvPr/>
+        </p:nvSpPr>
+        <p:spPr>
+          <a:xfrm>
+            <a:off x="442214" y="1798727"/>
+            <a:ext cx="958917" cy="646331"/>
+          </a:xfrm>
+          <a:prstGeom prst="rect">
+            <a:avLst/>
+          </a:prstGeom>
+          <a:noFill/>
+        </p:spPr>
+        <p:txBody>
+          <a:bodyPr wrap="none" rtlCol="0">
+            <a:spAutoFit/>
+          </a:bodyPr>
+          <a:lstStyle/>
+          <a:p>
+            <a:r>
+              <a:rPr lang="en-US" dirty="0"/>
+              <a:t>H = </a:t>
+            </a:r>
+            <a:r>
+              <a:rPr lang="en-US" dirty="0" smtClean="0"/>
+              <a:t>3.05</a:t>
+            </a:r>
+            <a:endParaRPr lang="en-US" dirty="0"/>
+          </a:p>
+          <a:p>
+            <a:endParaRPr lang="en-US" dirty="0"/>
+          </a:p>
+        </p:txBody>
+      </p:sp>
+      <p:sp>
+        <p:nvSpPr>
+          <p:cNvPr id="11" name="TextBox 10"/>
+          <p:cNvSpPr txBox="1"/>
+          <p:nvPr/>
+        </p:nvSpPr>
+        <p:spPr>
+          <a:xfrm>
+            <a:off x="442214" y="1521729"/>
+            <a:ext cx="2043380" cy="2308324"/>
+          </a:xfrm>
+          <a:prstGeom prst="rect">
+            <a:avLst/>
+          </a:prstGeom>
+          <a:noFill/>
+        </p:spPr>
+        <p:txBody>
+          <a:bodyPr wrap="none" rtlCol="0">
+            <a:spAutoFit/>
+          </a:bodyPr>
+          <a:lstStyle/>
+          <a:p>
+            <a:r>
+              <a:rPr lang="en-US" dirty="0" smtClean="0"/>
+              <a:t>Graham (2010)</a:t>
+            </a:r>
+          </a:p>
+          <a:p>
+            <a:endParaRPr lang="en-US" dirty="0" smtClean="0"/>
+          </a:p>
+          <a:p>
+            <a:r>
+              <a:rPr lang="en-US" dirty="0" err="1" smtClean="0"/>
+              <a:t>Y_nocues</a:t>
+            </a:r>
+            <a:r>
+              <a:rPr lang="en-US" dirty="0" smtClean="0"/>
+              <a:t> = 1.85</a:t>
+            </a:r>
+          </a:p>
+          <a:p>
+            <a:r>
+              <a:rPr lang="en-US" dirty="0" err="1" smtClean="0"/>
+              <a:t>Y_consistent</a:t>
+            </a:r>
+            <a:r>
+              <a:rPr lang="en-US" dirty="0" smtClean="0"/>
+              <a:t> = 2.7</a:t>
+            </a:r>
+          </a:p>
+          <a:p>
+            <a:endParaRPr lang="en-US" dirty="0"/>
+          </a:p>
+          <a:p>
+            <a:r>
+              <a:rPr lang="en-US" dirty="0" err="1" smtClean="0"/>
+              <a:t>Se_nocues</a:t>
+            </a:r>
+            <a:r>
+              <a:rPr lang="en-US" dirty="0" smtClean="0"/>
+              <a:t> = .16 </a:t>
+            </a:r>
+          </a:p>
+          <a:p>
+            <a:r>
+              <a:rPr lang="en-US" dirty="0" err="1" smtClean="0"/>
+              <a:t>Se_consistent</a:t>
+            </a:r>
+            <a:r>
+              <a:rPr lang="en-US" dirty="0" smtClean="0"/>
+              <a:t> </a:t>
+            </a:r>
+            <a:r>
+              <a:rPr lang="en-US" dirty="0"/>
+              <a:t>= .</a:t>
+            </a:r>
+            <a:r>
+              <a:rPr lang="en-US" dirty="0" smtClean="0"/>
+              <a:t>12 </a:t>
+            </a:r>
+            <a:endParaRPr lang="en-US" dirty="0"/>
+          </a:p>
+          <a:p>
+            <a:endParaRPr lang="en-US" dirty="0"/>
+          </a:p>
+        </p:txBody>
+      </p:sp>
+    </p:spTree>
+    <p:extLst>
+      <p:ext uri="{BB962C8B-B14F-4D97-AF65-F5344CB8AC3E}">
+        <p14:creationId xmlns:p14="http://schemas.microsoft.com/office/powerpoint/2010/main" val="1462826995"/>
+      </p:ext>
+    </p:extLst>
+  </p:cSld>
+  <p:clrMapOvr>
+    <a:masterClrMapping/>
+  </p:clrMapOvr>
+</p:sld>
+</file>
+
 <file path=ppt/theme/theme1.xml><?xml version="1.0" encoding="utf-8"?>
 <a:theme xmlns:a="http://schemas.openxmlformats.org/drawingml/2006/main" name="Office Theme">
   <a:themeElements>

</xml_diff>